<commit_message>
Change GameStartResult packet to recive name
</commit_message>
<xml_diff>
--- a/BGNL사용법설명.pptx
+++ b/BGNL사용법설명.pptx
@@ -3491,7 +3491,27 @@
           <a:p>
             <a:r>
               <a:rPr lang="ko-KR" altLang="en-US" dirty="0" smtClean="0"/>
-              <a:t>그냥 그대로 따라 쓰시길</a:t>
+              <a:t>상대방의 이름을 받아오고 싶으면 인수로 </a:t>
+            </a:r>
+            <a:r>
+              <a:rPr lang="en-US" altLang="ko-KR" dirty="0" err="1" smtClean="0">
+                <a:latin typeface="Consolas" panose="020B0609020204030204" pitchFamily="49" charset="0"/>
+                <a:ea typeface="HY궁서B" panose="02030600000101010101" pitchFamily="18" charset="-127"/>
+                <a:cs typeface="Consolas" panose="020B0609020204030204" pitchFamily="49" charset="0"/>
+              </a:rPr>
+              <a:t>wchar_t</a:t>
+            </a:r>
+            <a:r>
+              <a:rPr lang="en-US" altLang="ko-KR" dirty="0" smtClean="0">
+                <a:latin typeface="Consolas" panose="020B0609020204030204" pitchFamily="49" charset="0"/>
+                <a:ea typeface="HY궁서B" panose="02030600000101010101" pitchFamily="18" charset="-127"/>
+                <a:cs typeface="Consolas" panose="020B0609020204030204" pitchFamily="49" charset="0"/>
+              </a:rPr>
+              <a:t> </a:t>
+            </a:r>
+            <a:r>
+              <a:rPr lang="ko-KR" altLang="en-US" dirty="0" smtClean="0"/>
+              <a:t>배열을 넘겨주면 된다</a:t>
             </a:r>
             <a:r>
               <a:rPr lang="en-US" altLang="ko-KR" dirty="0" smtClean="0"/>
@@ -3503,100 +3523,157 @@
       </p:sp>
       <p:sp>
         <p:nvSpPr>
-          <p:cNvPr id="5" name="Rectangle 1"/>
-          <p:cNvSpPr>
-            <a:spLocks noChangeArrowheads="1"/>
-          </p:cNvSpPr>
+          <p:cNvPr id="8" name="직사각형 7"/>
+          <p:cNvSpPr/>
           <p:nvPr/>
         </p:nvSpPr>
-        <p:spPr bwMode="auto">
+        <p:spPr>
           <a:xfrm>
-            <a:off x="3291386" y="3708906"/>
-            <a:ext cx="5609228" cy="584775"/>
+            <a:off x="1424940" y="3462685"/>
+            <a:ext cx="9342120" cy="1077218"/>
           </a:xfrm>
           <a:prstGeom prst="rect">
             <a:avLst/>
           </a:prstGeom>
-          <a:solidFill>
-            <a:srgbClr val="FFFFFF"/>
-          </a:solidFill>
-          <a:ln>
-            <a:noFill/>
-          </a:ln>
-          <a:effectLst/>
-          <a:extLst>
-            <a:ext uri="{91240B29-F687-4F45-9708-019B960494DF}">
-              <a14:hiddenLine xmlns:a14="http://schemas.microsoft.com/office/drawing/2010/main" w="9525">
-                <a:solidFill>
-                  <a:schemeClr val="tx1"/>
-                </a:solidFill>
-                <a:miter lim="800000"/>
-                <a:headEnd/>
-                <a:tailEnd/>
-              </a14:hiddenLine>
-            </a:ext>
-            <a:ext uri="{AF507438-7753-43E0-B8FC-AC1667EBCBE1}">
-              <a14:hiddenEffects xmlns:a14="http://schemas.microsoft.com/office/drawing/2010/main">
-                <a:effectLst>
-                  <a:outerShdw dist="35921" dir="2700000" algn="ctr" rotWithShape="0">
-                    <a:schemeClr val="bg2"/>
-                  </a:outerShdw>
-                </a:effectLst>
-              </a14:hiddenEffects>
-            </a:ext>
-          </a:extLst>
         </p:spPr>
         <p:txBody>
-          <a:bodyPr vert="horz" wrap="none" lIns="91440" tIns="45720" rIns="91440" bIns="45720" numCol="1" anchor="ctr" anchorCtr="0" compatLnSpc="1">
-            <a:prstTxWarp prst="textNoShape">
-              <a:avLst/>
-            </a:prstTxWarp>
+          <a:bodyPr wrap="square">
             <a:spAutoFit/>
           </a:bodyPr>
           <a:lstStyle/>
           <a:p>
-            <a:pPr marL="0" marR="0" lvl="0" indent="0" algn="l" defTabSz="914400" rtl="0" eaLnBrk="0" fontAlgn="base" latinLnBrk="0" hangingPunct="0">
-              <a:lnSpc>
-                <a:spcPct val="100000"/>
-              </a:lnSpc>
-              <a:spcBef>
-                <a:spcPct val="0"/>
-              </a:spcBef>
-              <a:spcAft>
-                <a:spcPct val="0"/>
-              </a:spcAft>
-              <a:buClrTx/>
-              <a:buSzTx/>
-              <a:buFontTx/>
-              <a:buNone/>
-              <a:tabLst/>
-            </a:pPr>
-            <a:r>
-              <a:rPr kumimoji="0" lang="ko-KR" altLang="ko-KR" sz="3200" b="0" i="0" u="none" strike="noStrike" cap="none" normalizeH="0" baseline="0" dirty="0" smtClean="0">
-                <a:ln>
-                  <a:noFill/>
-                </a:ln>
-                <a:solidFill>
-                  <a:srgbClr val="000000"/>
-                </a:solidFill>
-                <a:effectLst/>
-                <a:latin typeface="Consolas" panose="020B0609020204030204" pitchFamily="49" charset="0"/>
-                <a:ea typeface="Bitstream Vera Sans Mono" panose="020B0609030804020204" pitchFamily="49" charset="-127"/>
-                <a:cs typeface="Consolas" panose="020B0609020204030204" pitchFamily="49" charset="0"/>
-              </a:rPr>
-              <a:t>network.WaitForStart(); </a:t>
-            </a:r>
-            <a:endParaRPr kumimoji="0" lang="ko-KR" altLang="ko-KR" sz="3200" b="0" i="0" u="none" strike="noStrike" cap="none" normalizeH="0" baseline="0" dirty="0" smtClean="0">
-              <a:ln>
-                <a:noFill/>
-              </a:ln>
-              <a:solidFill>
-                <a:schemeClr val="tx1"/>
-              </a:solidFill>
-              <a:effectLst/>
-              <a:latin typeface="Consolas" panose="020B0609020204030204" pitchFamily="49" charset="0"/>
-              <a:cs typeface="Consolas" panose="020B0609020204030204" pitchFamily="49" charset="0"/>
-            </a:endParaRPr>
+            <a:r>
+              <a:rPr lang="en-US" altLang="ko-KR" sz="3200" dirty="0" err="1">
+                <a:solidFill>
+                  <a:srgbClr val="0000FF"/>
+                </a:solidFill>
+                <a:highlight>
+                  <a:srgbClr val="FFFFFF"/>
+                </a:highlight>
+                <a:latin typeface="Consolas" panose="020B0609020204030204" pitchFamily="49" charset="0"/>
+                <a:cs typeface="Consolas" panose="020B0609020204030204" pitchFamily="49" charset="0"/>
+              </a:rPr>
+              <a:t>wchar_t</a:t>
+            </a:r>
+            <a:r>
+              <a:rPr lang="en-US" altLang="ko-KR" sz="3200" dirty="0">
+                <a:solidFill>
+                  <a:srgbClr val="000000"/>
+                </a:solidFill>
+                <a:highlight>
+                  <a:srgbClr val="FFFFFF"/>
+                </a:highlight>
+                <a:latin typeface="Consolas" panose="020B0609020204030204" pitchFamily="49" charset="0"/>
+                <a:cs typeface="Consolas" panose="020B0609020204030204" pitchFamily="49" charset="0"/>
+              </a:rPr>
+              <a:t> </a:t>
+            </a:r>
+            <a:r>
+              <a:rPr lang="en-US" altLang="ko-KR" sz="3200" dirty="0" err="1" smtClean="0">
+                <a:solidFill>
+                  <a:srgbClr val="000000"/>
+                </a:solidFill>
+                <a:highlight>
+                  <a:srgbClr val="FFFFFF"/>
+                </a:highlight>
+                <a:latin typeface="Consolas" panose="020B0609020204030204" pitchFamily="49" charset="0"/>
+                <a:cs typeface="Consolas" panose="020B0609020204030204" pitchFamily="49" charset="0"/>
+              </a:rPr>
+              <a:t>enemyName</a:t>
+            </a:r>
+            <a:r>
+              <a:rPr lang="en-US" altLang="ko-KR" sz="3200" dirty="0" smtClean="0">
+                <a:solidFill>
+                  <a:srgbClr val="000000"/>
+                </a:solidFill>
+                <a:highlight>
+                  <a:srgbClr val="FFFFFF"/>
+                </a:highlight>
+                <a:latin typeface="Consolas" panose="020B0609020204030204" pitchFamily="49" charset="0"/>
+                <a:cs typeface="Consolas" panose="020B0609020204030204" pitchFamily="49" charset="0"/>
+              </a:rPr>
+              <a:t>[</a:t>
+            </a:r>
+            <a:r>
+              <a:rPr lang="en-US" altLang="ko-KR" sz="3200" dirty="0" smtClean="0">
+                <a:solidFill>
+                  <a:srgbClr val="6F008A"/>
+                </a:solidFill>
+                <a:highlight>
+                  <a:srgbClr val="FFFFFF"/>
+                </a:highlight>
+                <a:latin typeface="Consolas" panose="020B0609020204030204" pitchFamily="49" charset="0"/>
+                <a:cs typeface="Consolas" panose="020B0609020204030204" pitchFamily="49" charset="0"/>
+              </a:rPr>
+              <a:t>MAX_NAME_LEN</a:t>
+            </a:r>
+            <a:r>
+              <a:rPr lang="en-US" altLang="ko-KR" sz="3200" dirty="0">
+                <a:solidFill>
+                  <a:srgbClr val="000000"/>
+                </a:solidFill>
+                <a:highlight>
+                  <a:srgbClr val="FFFFFF"/>
+                </a:highlight>
+                <a:latin typeface="Consolas" panose="020B0609020204030204" pitchFamily="49" charset="0"/>
+                <a:cs typeface="Consolas" panose="020B0609020204030204" pitchFamily="49" charset="0"/>
+              </a:rPr>
+              <a:t>] = { 0, };</a:t>
+            </a:r>
+          </a:p>
+          <a:p>
+            <a:r>
+              <a:rPr lang="en-US" altLang="ko-KR" sz="3200" dirty="0" err="1" smtClean="0">
+                <a:solidFill>
+                  <a:srgbClr val="000000"/>
+                </a:solidFill>
+                <a:highlight>
+                  <a:srgbClr val="FFFFFF"/>
+                </a:highlight>
+                <a:latin typeface="Consolas" panose="020B0609020204030204" pitchFamily="49" charset="0"/>
+                <a:cs typeface="Consolas" panose="020B0609020204030204" pitchFamily="49" charset="0"/>
+              </a:rPr>
+              <a:t>network.WaitForStart</a:t>
+            </a:r>
+            <a:r>
+              <a:rPr lang="en-US" altLang="ko-KR" sz="3200" dirty="0" smtClean="0">
+                <a:solidFill>
+                  <a:srgbClr val="000000"/>
+                </a:solidFill>
+                <a:highlight>
+                  <a:srgbClr val="FFFFFF"/>
+                </a:highlight>
+                <a:latin typeface="Consolas" panose="020B0609020204030204" pitchFamily="49" charset="0"/>
+                <a:cs typeface="Consolas" panose="020B0609020204030204" pitchFamily="49" charset="0"/>
+              </a:rPr>
+              <a:t>(</a:t>
+            </a:r>
+            <a:r>
+              <a:rPr lang="en-US" altLang="ko-KR" sz="3200" dirty="0" err="1" smtClean="0">
+                <a:solidFill>
+                  <a:srgbClr val="000000"/>
+                </a:solidFill>
+                <a:highlight>
+                  <a:srgbClr val="FFFFFF"/>
+                </a:highlight>
+                <a:latin typeface="Consolas" panose="020B0609020204030204" pitchFamily="49" charset="0"/>
+                <a:cs typeface="Consolas" panose="020B0609020204030204" pitchFamily="49" charset="0"/>
+              </a:rPr>
+              <a:t>enemyName</a:t>
+            </a:r>
+            <a:r>
+              <a:rPr lang="en-US" altLang="ko-KR" sz="3200" dirty="0">
+                <a:solidFill>
+                  <a:srgbClr val="000000"/>
+                </a:solidFill>
+                <a:highlight>
+                  <a:srgbClr val="FFFFFF"/>
+                </a:highlight>
+                <a:latin typeface="Consolas" panose="020B0609020204030204" pitchFamily="49" charset="0"/>
+                <a:cs typeface="Consolas" panose="020B0609020204030204" pitchFamily="49" charset="0"/>
+              </a:rPr>
+              <a:t>);</a:t>
+            </a:r>
           </a:p>
         </p:txBody>
       </p:sp>
@@ -3724,11 +3801,7 @@
             </a:r>
             <a:r>
               <a:rPr lang="ko-KR" altLang="en-US" dirty="0" smtClean="0"/>
-              <a:t> </a:t>
-            </a:r>
-            <a:r>
-              <a:rPr lang="ko-KR" altLang="en-US" dirty="0" smtClean="0"/>
-              <a:t>정보 전송</a:t>
+              <a:t> 정보 전송</a:t>
             </a:r>
             <a:endParaRPr lang="en-US" altLang="ko-KR" dirty="0" smtClean="0"/>
           </a:p>
@@ -4030,11 +4103,7 @@
             </a:r>
             <a:r>
               <a:rPr lang="ko-KR" altLang="en-US" dirty="0" smtClean="0"/>
-              <a:t> </a:t>
-            </a:r>
-            <a:r>
-              <a:rPr lang="ko-KR" altLang="en-US" dirty="0" smtClean="0"/>
-              <a:t>정보 전송</a:t>
+              <a:t> 정보 전송</a:t>
             </a:r>
             <a:endParaRPr lang="ko-KR" altLang="en-US" dirty="0"/>
           </a:p>
@@ -4061,91 +4130,80 @@
             </a:r>
             <a:r>
               <a:rPr lang="ko-KR" altLang="en-US" dirty="0" smtClean="0"/>
+              <a:t> 정보는 </a:t>
+            </a:r>
+            <a:r>
+              <a:rPr lang="en-US" altLang="ko-KR" dirty="0" smtClean="0">
+                <a:latin typeface="Consolas" panose="020B0609020204030204" pitchFamily="49" charset="0"/>
+                <a:cs typeface="Consolas" panose="020B0609020204030204" pitchFamily="49" charset="0"/>
+              </a:rPr>
+              <a:t>char</a:t>
+            </a:r>
+            <a:r>
+              <a:rPr lang="ko-KR" altLang="en-US" dirty="0" smtClean="0">
+                <a:latin typeface="Consolas" panose="020B0609020204030204" pitchFamily="49" charset="0"/>
+                <a:cs typeface="Consolas" panose="020B0609020204030204" pitchFamily="49" charset="0"/>
+              </a:rPr>
+              <a:t>형 </a:t>
+            </a:r>
+            <a:r>
+              <a:rPr lang="en-US" altLang="ko-KR" dirty="0" smtClean="0">
+                <a:latin typeface="Consolas" panose="020B0609020204030204" pitchFamily="49" charset="0"/>
+                <a:cs typeface="Consolas" panose="020B0609020204030204" pitchFamily="49" charset="0"/>
+              </a:rPr>
+              <a:t>8</a:t>
+            </a:r>
+            <a:r>
+              <a:rPr lang="ko-KR" altLang="en-US" dirty="0" smtClean="0">
+                <a:latin typeface="Consolas" panose="020B0609020204030204" pitchFamily="49" charset="0"/>
+                <a:cs typeface="Consolas" panose="020B0609020204030204" pitchFamily="49" charset="0"/>
+              </a:rPr>
+              <a:t>*</a:t>
+            </a:r>
+            <a:r>
+              <a:rPr lang="en-US" altLang="ko-KR" dirty="0" smtClean="0">
+                <a:latin typeface="Consolas" panose="020B0609020204030204" pitchFamily="49" charset="0"/>
+                <a:cs typeface="Consolas" panose="020B0609020204030204" pitchFamily="49" charset="0"/>
+              </a:rPr>
+              <a:t>8 </a:t>
+            </a:r>
+            <a:r>
+              <a:rPr lang="ko-KR" altLang="en-US" dirty="0" smtClean="0">
+                <a:latin typeface="Consolas" panose="020B0609020204030204" pitchFamily="49" charset="0"/>
+                <a:cs typeface="Consolas" panose="020B0609020204030204" pitchFamily="49" charset="0"/>
+              </a:rPr>
+              <a:t>크기 배열</a:t>
+            </a:r>
+            <a:r>
+              <a:rPr lang="en-US" altLang="ko-KR" dirty="0" smtClean="0">
+                <a:latin typeface="Consolas" panose="020B0609020204030204" pitchFamily="49" charset="0"/>
+                <a:cs typeface="Consolas" panose="020B0609020204030204" pitchFamily="49" charset="0"/>
+              </a:rPr>
+              <a:t>.</a:t>
+            </a:r>
+            <a:endParaRPr lang="en-US" altLang="ko-KR" dirty="0" smtClean="0"/>
+          </a:p>
+          <a:p>
+            <a:r>
+              <a:rPr lang="ko-KR" altLang="en-US" dirty="0" err="1" smtClean="0">
+                <a:latin typeface="Consolas" panose="020B0609020204030204" pitchFamily="49" charset="0"/>
+                <a:cs typeface="Consolas" panose="020B0609020204030204" pitchFamily="49" charset="0"/>
+              </a:rPr>
+              <a:t>맵</a:t>
+            </a:r>
+            <a:r>
+              <a:rPr lang="ko-KR" altLang="en-US" dirty="0">
+                <a:latin typeface="Consolas" panose="020B0609020204030204" pitchFamily="49" charset="0"/>
+                <a:cs typeface="Consolas" panose="020B0609020204030204" pitchFamily="49" charset="0"/>
+              </a:rPr>
               <a:t> </a:t>
             </a:r>
             <a:r>
-              <a:rPr lang="ko-KR" altLang="en-US" dirty="0" smtClean="0"/>
-              <a:t>정보는 </a:t>
-            </a:r>
-            <a:r>
-              <a:rPr lang="en-US" altLang="ko-KR" dirty="0" smtClean="0">
-                <a:latin typeface="Consolas" panose="020B0609020204030204" pitchFamily="49" charset="0"/>
-                <a:cs typeface="Consolas" panose="020B0609020204030204" pitchFamily="49" charset="0"/>
-              </a:rPr>
-              <a:t>char</a:t>
-            </a:r>
-            <a:r>
               <a:rPr lang="ko-KR" altLang="en-US" dirty="0" smtClean="0">
                 <a:latin typeface="Consolas" panose="020B0609020204030204" pitchFamily="49" charset="0"/>
                 <a:cs typeface="Consolas" panose="020B0609020204030204" pitchFamily="49" charset="0"/>
               </a:rPr>
-              <a:t>형 </a:t>
-            </a:r>
-            <a:r>
-              <a:rPr lang="en-US" altLang="ko-KR" dirty="0" smtClean="0">
-                <a:latin typeface="Consolas" panose="020B0609020204030204" pitchFamily="49" charset="0"/>
-                <a:cs typeface="Consolas" panose="020B0609020204030204" pitchFamily="49" charset="0"/>
-              </a:rPr>
-              <a:t>8</a:t>
-            </a:r>
-            <a:r>
-              <a:rPr lang="ko-KR" altLang="en-US" dirty="0" smtClean="0">
-                <a:latin typeface="Consolas" panose="020B0609020204030204" pitchFamily="49" charset="0"/>
-                <a:cs typeface="Consolas" panose="020B0609020204030204" pitchFamily="49" charset="0"/>
-              </a:rPr>
-              <a:t>*</a:t>
-            </a:r>
-            <a:r>
-              <a:rPr lang="en-US" altLang="ko-KR" dirty="0" smtClean="0">
-                <a:latin typeface="Consolas" panose="020B0609020204030204" pitchFamily="49" charset="0"/>
-                <a:cs typeface="Consolas" panose="020B0609020204030204" pitchFamily="49" charset="0"/>
-              </a:rPr>
-              <a:t>8 </a:t>
-            </a:r>
-            <a:r>
-              <a:rPr lang="ko-KR" altLang="en-US" dirty="0" smtClean="0">
-                <a:latin typeface="Consolas" panose="020B0609020204030204" pitchFamily="49" charset="0"/>
-                <a:cs typeface="Consolas" panose="020B0609020204030204" pitchFamily="49" charset="0"/>
-              </a:rPr>
-              <a:t>크기 배열</a:t>
-            </a:r>
-            <a:r>
-              <a:rPr lang="en-US" altLang="ko-KR" dirty="0" smtClean="0">
-                <a:latin typeface="Consolas" panose="020B0609020204030204" pitchFamily="49" charset="0"/>
-                <a:cs typeface="Consolas" panose="020B0609020204030204" pitchFamily="49" charset="0"/>
-              </a:rPr>
-              <a:t>.</a:t>
-            </a:r>
-            <a:endParaRPr lang="en-US" altLang="ko-KR" dirty="0" smtClean="0"/>
-          </a:p>
-          <a:p>
-            <a:r>
-              <a:rPr lang="ko-KR" altLang="en-US" dirty="0" err="1" smtClean="0">
-                <a:latin typeface="Consolas" panose="020B0609020204030204" pitchFamily="49" charset="0"/>
-                <a:cs typeface="Consolas" panose="020B0609020204030204" pitchFamily="49" charset="0"/>
-              </a:rPr>
-              <a:t>맵</a:t>
-            </a:r>
-            <a:r>
-              <a:rPr lang="ko-KR" altLang="en-US" dirty="0">
-                <a:latin typeface="Consolas" panose="020B0609020204030204" pitchFamily="49" charset="0"/>
-                <a:cs typeface="Consolas" panose="020B0609020204030204" pitchFamily="49" charset="0"/>
-              </a:rPr>
-              <a:t> </a:t>
-            </a:r>
-            <a:r>
-              <a:rPr lang="ko-KR" altLang="en-US" dirty="0" smtClean="0">
-                <a:latin typeface="Consolas" panose="020B0609020204030204" pitchFamily="49" charset="0"/>
-                <a:cs typeface="Consolas" panose="020B0609020204030204" pitchFamily="49" charset="0"/>
-              </a:rPr>
-              <a:t>정보를</a:t>
-            </a:r>
-            <a:r>
-              <a:rPr lang="ko-KR" altLang="en-US" dirty="0" smtClean="0">
-                <a:latin typeface="Consolas" panose="020B0609020204030204" pitchFamily="49" charset="0"/>
-                <a:cs typeface="Consolas" panose="020B0609020204030204" pitchFamily="49" charset="0"/>
-              </a:rPr>
-              <a:t> 만드는 방법은 크게 두 가지가 있다</a:t>
+              <a:t>정보를 만드는 방법은 크게 두 가지가 있다</a:t>
             </a:r>
             <a:r>
               <a:rPr lang="en-US" altLang="ko-KR" dirty="0" smtClean="0">
@@ -4307,22 +4365,7 @@
                 <a:ea typeface="Bitstream Vera Sans Mono" panose="020B0609030804020204" pitchFamily="49" charset="-127"/>
                 <a:cs typeface="Consolas" panose="020B0609020204030204" pitchFamily="49" charset="0"/>
               </a:rPr>
-              <a:t>network.SubmitMap(mapData</a:t>
-            </a:r>
-            <a:r>
-              <a:rPr kumimoji="0" lang="ko-KR" altLang="ko-KR" sz="3200" b="0" i="0" u="none" strike="noStrike" cap="none" normalizeH="0" baseline="0" dirty="0" smtClean="0">
-                <a:ln>
-                  <a:noFill/>
-                </a:ln>
-                <a:solidFill>
-                  <a:srgbClr val="000000"/>
-                </a:solidFill>
-                <a:effectLst/>
-                <a:latin typeface="Consolas" panose="020B0609020204030204" pitchFamily="49" charset="0"/>
-                <a:ea typeface="Bitstream Vera Sans Mono" panose="020B0609030804020204" pitchFamily="49" charset="-127"/>
-                <a:cs typeface="Consolas" panose="020B0609020204030204" pitchFamily="49" charset="0"/>
-              </a:rPr>
-              <a:t>);</a:t>
+              <a:t>network.SubmitMap(mapData);</a:t>
             </a:r>
             <a:endParaRPr kumimoji="0" lang="ko-KR" altLang="ko-KR" sz="3200" b="0" i="0" u="none" strike="noStrike" cap="none" normalizeH="0" baseline="0" dirty="0" smtClean="0">
               <a:ln>
@@ -4385,11 +4428,7 @@
           <a:p>
             <a:r>
               <a:rPr lang="en-US" altLang="ko-KR" dirty="0" smtClean="0"/>
-              <a:t>6</a:t>
-            </a:r>
-            <a:r>
-              <a:rPr lang="en-US" altLang="ko-KR" dirty="0" smtClean="0"/>
-              <a:t>.1.1. </a:t>
+              <a:t>6.1.1. </a:t>
             </a:r>
             <a:r>
               <a:rPr lang="ko-KR" altLang="en-US" dirty="0" smtClean="0"/>
@@ -5326,11 +5365,7 @@
           <a:p>
             <a:r>
               <a:rPr lang="en-US" altLang="ko-KR" dirty="0" smtClean="0"/>
-              <a:t>6</a:t>
-            </a:r>
-            <a:r>
-              <a:rPr lang="en-US" altLang="ko-KR" dirty="0" smtClean="0"/>
-              <a:t>.1.2. </a:t>
+              <a:t>6.1.2. </a:t>
             </a:r>
             <a:r>
               <a:rPr lang="en-US" altLang="ko-KR" dirty="0" err="1" smtClean="0"/>
@@ -5416,11 +5451,7 @@
             <a:pPr lvl="1"/>
             <a:r>
               <a:rPr lang="en-US" altLang="ko-KR" dirty="0" smtClean="0"/>
-              <a:t>1</a:t>
-            </a:r>
-            <a:r>
-              <a:rPr lang="en-US" altLang="ko-KR" dirty="0" smtClean="0"/>
-              <a:t>. </a:t>
+              <a:t>1. </a:t>
             </a:r>
             <a:r>
               <a:rPr lang="ko-KR" altLang="en-US" dirty="0" smtClean="0"/>
@@ -5435,11 +5466,7 @@
             <a:pPr lvl="2"/>
             <a:r>
               <a:rPr lang="en-US" altLang="ko-KR" dirty="0" smtClean="0"/>
-              <a:t>1</a:t>
-            </a:r>
-            <a:r>
-              <a:rPr lang="en-US" altLang="ko-KR" dirty="0" smtClean="0"/>
-              <a:t>.1. </a:t>
+              <a:t>1.1. </a:t>
             </a:r>
             <a:r>
               <a:rPr lang="ko-KR" altLang="en-US" dirty="0" smtClean="0"/>
@@ -5459,27 +5486,19 @@
             <a:pPr lvl="2"/>
             <a:r>
               <a:rPr lang="en-US" altLang="ko-KR" dirty="0" smtClean="0"/>
-              <a:t>1</a:t>
-            </a:r>
+              <a:t>1.2. </a:t>
+            </a:r>
+            <a:r>
+              <a:rPr lang="ko-KR" altLang="en-US" dirty="0" smtClean="0"/>
+              <a:t>객체에서 배의 위치 배열을 가져와서 배열에 하나하나 넣기</a:t>
+            </a:r>
+            <a:endParaRPr lang="en-US" altLang="ko-KR" dirty="0" smtClean="0"/>
+          </a:p>
+          <a:p>
+            <a:pPr lvl="1"/>
             <a:r>
               <a:rPr lang="en-US" altLang="ko-KR" dirty="0" smtClean="0"/>
-              <a:t>.2. </a:t>
-            </a:r>
-            <a:r>
-              <a:rPr lang="ko-KR" altLang="en-US" dirty="0" smtClean="0"/>
-              <a:t>객체에서 배의 위치 배열을 가져와서 배열에 하나하나 넣기</a:t>
-            </a:r>
-            <a:endParaRPr lang="en-US" altLang="ko-KR" dirty="0" smtClean="0"/>
-          </a:p>
-          <a:p>
-            <a:pPr lvl="1"/>
-            <a:r>
-              <a:rPr lang="en-US" altLang="ko-KR" dirty="0" smtClean="0"/>
-              <a:t>2</a:t>
-            </a:r>
-            <a:r>
-              <a:rPr lang="en-US" altLang="ko-KR" dirty="0" smtClean="0"/>
-              <a:t>. </a:t>
+              <a:t>2. </a:t>
             </a:r>
             <a:r>
               <a:rPr lang="ko-KR" altLang="en-US" dirty="0" smtClean="0"/>
@@ -5495,11 +5514,7 @@
             <a:pPr lvl="1"/>
             <a:r>
               <a:rPr lang="en-US" altLang="ko-KR" dirty="0" smtClean="0"/>
-              <a:t>3</a:t>
-            </a:r>
-            <a:r>
-              <a:rPr lang="en-US" altLang="ko-KR" dirty="0" smtClean="0"/>
-              <a:t>. </a:t>
+              <a:t>3. </a:t>
             </a:r>
             <a:r>
               <a:rPr lang="ko-KR" altLang="en-US" dirty="0" smtClean="0"/>
@@ -5821,11 +5836,7 @@
           <a:p>
             <a:r>
               <a:rPr lang="en-US" altLang="ko-KR" dirty="0" smtClean="0"/>
-              <a:t>6</a:t>
-            </a:r>
-            <a:r>
-              <a:rPr lang="en-US" altLang="ko-KR" dirty="0" smtClean="0"/>
-              <a:t>.1.2. </a:t>
+              <a:t>6.1.2. </a:t>
             </a:r>
             <a:r>
               <a:rPr lang="en-US" altLang="ko-KR" dirty="0" err="1" smtClean="0"/>
@@ -6346,11 +6357,7 @@
           <a:p>
             <a:r>
               <a:rPr lang="en-US" altLang="ko-KR" dirty="0" smtClean="0"/>
-              <a:t>6</a:t>
-            </a:r>
-            <a:r>
-              <a:rPr lang="en-US" altLang="ko-KR" dirty="0" smtClean="0"/>
-              <a:t>.1.2. </a:t>
+              <a:t>6.1.2. </a:t>
             </a:r>
             <a:r>
               <a:rPr lang="en-US" altLang="ko-KR" dirty="0" err="1" smtClean="0"/>
@@ -6744,11 +6751,7 @@
           <a:p>
             <a:r>
               <a:rPr lang="en-US" altLang="ko-KR" dirty="0" smtClean="0"/>
-              <a:t>6</a:t>
-            </a:r>
-            <a:r>
-              <a:rPr lang="en-US" altLang="ko-KR" dirty="0" smtClean="0"/>
-              <a:t>.1.2. </a:t>
+              <a:t>6.1.2. </a:t>
             </a:r>
             <a:r>
               <a:rPr lang="en-US" altLang="ko-KR" dirty="0" err="1" smtClean="0"/>
@@ -7383,11 +7386,7 @@
           <a:p>
             <a:r>
               <a:rPr lang="en-US" altLang="ko-KR" dirty="0" smtClean="0"/>
-              <a:t>6</a:t>
-            </a:r>
-            <a:r>
-              <a:rPr lang="en-US" altLang="ko-KR" dirty="0" smtClean="0"/>
-              <a:t>.1.2. </a:t>
+              <a:t>6.1.2. </a:t>
             </a:r>
             <a:r>
               <a:rPr lang="en-US" altLang="ko-KR" dirty="0" err="1" smtClean="0"/>
@@ -16571,11 +16570,7 @@
             </a:r>
             <a:r>
               <a:rPr lang="en-US" altLang="ko-KR" dirty="0" smtClean="0"/>
-              <a:t>(Coordinate</a:t>
-            </a:r>
-            <a:r>
-              <a:rPr lang="en-US" altLang="ko-KR" dirty="0" smtClean="0"/>
-              <a:t>) </a:t>
+              <a:t>(Coordinate) </a:t>
             </a:r>
             <a:r>
               <a:rPr lang="ko-KR" altLang="en-US" dirty="0" err="1" smtClean="0"/>
@@ -16625,11 +16620,7 @@
             </a:r>
             <a:r>
               <a:rPr lang="en-US" altLang="ko-KR" dirty="0" smtClean="0"/>
-              <a:t>0</a:t>
-            </a:r>
-            <a:r>
-              <a:rPr lang="en-US" altLang="ko-KR" dirty="0" smtClean="0"/>
-              <a:t>, 0</a:t>
+              <a:t>0, 0</a:t>
             </a:r>
             <a:r>
               <a:rPr lang="ko-KR" altLang="en-US" dirty="0" smtClean="0"/>
@@ -17565,11 +17556,7 @@
             </a:r>
             <a:r>
               <a:rPr lang="ko-KR" altLang="en-US" dirty="0" smtClean="0"/>
-              <a:t>쉽고 단순한 방법은 그냥 프로젝트 폴더에 다 </a:t>
-            </a:r>
-            <a:r>
-              <a:rPr lang="ko-KR" altLang="en-US" dirty="0" smtClean="0"/>
-              <a:t>집어넣기</a:t>
+              <a:t>쉽고 단순한 방법은 그냥 프로젝트 폴더에 다 집어넣기</a:t>
             </a:r>
             <a:endParaRPr lang="en-US" altLang="ko-KR" dirty="0" smtClean="0"/>
           </a:p>

</xml_diff>

<commit_message>
change WaitForStart output way
</commit_message>
<xml_diff>
--- a/BGNL사용법설명.pptx
+++ b/BGNL사용법설명.pptx
@@ -3142,11 +3142,7 @@
             </a:r>
             <a:r>
               <a:rPr lang="ko-KR" altLang="en-US" dirty="0" smtClean="0"/>
-              <a:t>학번 </a:t>
-            </a:r>
-            <a:r>
-              <a:rPr lang="ko-KR" altLang="en-US" dirty="0" smtClean="0"/>
-              <a:t>전송 </a:t>
+              <a:t>학번 전송 </a:t>
             </a:r>
             <a:r>
               <a:rPr lang="en-US" altLang="ko-KR" dirty="0" smtClean="0"/>
@@ -3189,11 +3185,7 @@
             </a:r>
             <a:r>
               <a:rPr lang="ko-KR" altLang="en-US" dirty="0" smtClean="0"/>
-              <a:t>이름과 자신의 학번을 </a:t>
-            </a:r>
-            <a:r>
-              <a:rPr lang="ko-KR" altLang="en-US" dirty="0" smtClean="0"/>
-              <a:t>보낸다</a:t>
+              <a:t>이름과 자신의 학번을 보낸다</a:t>
             </a:r>
             <a:r>
               <a:rPr lang="en-US" altLang="ko-KR" dirty="0" smtClean="0"/>
@@ -3401,14 +3393,7 @@
                 <a:latin typeface="Consolas" panose="020B0609020204030204" pitchFamily="49" charset="0"/>
                 <a:cs typeface="Consolas" panose="020B0609020204030204" pitchFamily="49" charset="0"/>
               </a:rPr>
-              <a:t>, </a:t>
-            </a:r>
-            <a:r>
-              <a:rPr lang="en-US" altLang="ko-KR" sz="3200" dirty="0" smtClean="0">
-                <a:latin typeface="Consolas" panose="020B0609020204030204" pitchFamily="49" charset="0"/>
-                <a:cs typeface="Consolas" panose="020B0609020204030204" pitchFamily="49" charset="0"/>
-              </a:rPr>
-              <a:t>140001</a:t>
+              <a:t>, 140001</a:t>
             </a:r>
             <a:r>
               <a:rPr kumimoji="0" lang="ko-KR" altLang="ko-KR" sz="3200" b="0" i="0" u="none" strike="noStrike" cap="none" normalizeH="0" baseline="0" dirty="0" smtClean="0">
@@ -3555,7 +3540,6 @@
               <a:rPr lang="en-US" altLang="ko-KR" dirty="0" smtClean="0"/>
               <a:t>.</a:t>
             </a:r>
-            <a:endParaRPr lang="en-US" altLang="ko-KR" dirty="0" smtClean="0"/>
           </a:p>
         </p:txBody>
       </p:sp>
@@ -3664,7 +3648,7 @@
                 </a:highlight>
                 <a:latin typeface="Bitstream Vera Sans Mono" panose="020B0609030804020204" pitchFamily="49" charset="0"/>
               </a:rPr>
-              <a:t>gameStartData</a:t>
+              <a:t>network.WaitForStart</a:t>
             </a:r>
             <a:r>
               <a:rPr lang="en-US" altLang="ko-KR" sz="3200" dirty="0" smtClean="0">
@@ -3676,10 +3660,10 @@
                 </a:highlight>
                 <a:latin typeface="Bitstream Vera Sans Mono" panose="020B0609030804020204" pitchFamily="49" charset="0"/>
               </a:rPr>
-              <a:t> </a:t>
-            </a:r>
-            <a:r>
-              <a:rPr lang="en-US" altLang="ko-KR" sz="3200" dirty="0">
+              <a:t>(</a:t>
+            </a:r>
+            <a:r>
+              <a:rPr lang="en-US" altLang="ko-KR" sz="3200" dirty="0" smtClean="0">
                 <a:solidFill>
                   <a:srgbClr val="000000"/>
                 </a:solidFill>
@@ -3688,10 +3672,10 @@
                 </a:highlight>
                 <a:latin typeface="Bitstream Vera Sans Mono" panose="020B0609030804020204" pitchFamily="49" charset="0"/>
               </a:rPr>
-              <a:t>= </a:t>
-            </a:r>
-            <a:r>
-              <a:rPr lang="en-US" altLang="ko-KR" sz="3200" dirty="0" err="1">
+              <a:t>&amp;</a:t>
+            </a:r>
+            <a:r>
+              <a:rPr lang="en-US" altLang="ko-KR" sz="3200" dirty="0" err="1" smtClean="0">
                 <a:solidFill>
                   <a:srgbClr val="000000"/>
                 </a:solidFill>
@@ -3700,7 +3684,7 @@
                 </a:highlight>
                 <a:latin typeface="Bitstream Vera Sans Mono" panose="020B0609030804020204" pitchFamily="49" charset="0"/>
               </a:rPr>
-              <a:t>network.WaitForStart</a:t>
+              <a:t>gameStartData</a:t>
             </a:r>
             <a:r>
               <a:rPr lang="en-US" altLang="ko-KR" sz="3200" dirty="0">
@@ -3712,8 +3696,17 @@
                 </a:highlight>
                 <a:latin typeface="Bitstream Vera Sans Mono" panose="020B0609030804020204" pitchFamily="49" charset="0"/>
               </a:rPr>
-              <a:t>();</a:t>
-            </a:r>
+              <a:t>);</a:t>
+            </a:r>
+            <a:endParaRPr lang="en-US" altLang="ko-KR" sz="3200" dirty="0">
+              <a:solidFill>
+                <a:srgbClr val="000000"/>
+              </a:solidFill>
+              <a:highlight>
+                <a:srgbClr val="FFFFFF"/>
+              </a:highlight>
+              <a:latin typeface="Bitstream Vera Sans Mono" panose="020B0609030804020204" pitchFamily="49" charset="0"/>
+            </a:endParaRPr>
           </a:p>
         </p:txBody>
       </p:sp>

</xml_diff>

<commit_message>
Add PPT & Enhenced Coord & more Example comment
</commit_message>
<xml_diff>
--- a/BGNL사용법설명.pptx
+++ b/BGNL사용법설명.pptx
@@ -3660,10 +3660,10 @@
                 </a:highlight>
                 <a:latin typeface="Bitstream Vera Sans Mono" panose="020B0609030804020204" pitchFamily="49" charset="0"/>
               </a:rPr>
-              <a:t>(</a:t>
-            </a:r>
-            <a:r>
-              <a:rPr lang="en-US" altLang="ko-KR" sz="3200" dirty="0" smtClean="0">
+              <a:t>(&amp;</a:t>
+            </a:r>
+            <a:r>
+              <a:rPr lang="en-US" altLang="ko-KR" sz="3200" dirty="0" err="1" smtClean="0">
                 <a:solidFill>
                   <a:srgbClr val="000000"/>
                 </a:solidFill>
@@ -3672,10 +3672,10 @@
                 </a:highlight>
                 <a:latin typeface="Bitstream Vera Sans Mono" panose="020B0609030804020204" pitchFamily="49" charset="0"/>
               </a:rPr>
-              <a:t>&amp;</a:t>
-            </a:r>
-            <a:r>
-              <a:rPr lang="en-US" altLang="ko-KR" sz="3200" dirty="0" err="1" smtClean="0">
+              <a:t>gameStartData</a:t>
+            </a:r>
+            <a:r>
+              <a:rPr lang="en-US" altLang="ko-KR" sz="3200" dirty="0">
                 <a:solidFill>
                   <a:srgbClr val="000000"/>
                 </a:solidFill>
@@ -3684,29 +3684,8 @@
                 </a:highlight>
                 <a:latin typeface="Bitstream Vera Sans Mono" panose="020B0609030804020204" pitchFamily="49" charset="0"/>
               </a:rPr>
-              <a:t>gameStartData</a:t>
-            </a:r>
-            <a:r>
-              <a:rPr lang="en-US" altLang="ko-KR" sz="3200" dirty="0">
-                <a:solidFill>
-                  <a:srgbClr val="000000"/>
-                </a:solidFill>
-                <a:highlight>
-                  <a:srgbClr val="FFFFFF"/>
-                </a:highlight>
-                <a:latin typeface="Bitstream Vera Sans Mono" panose="020B0609030804020204" pitchFamily="49" charset="0"/>
-              </a:rPr>
               <a:t>);</a:t>
             </a:r>
-            <a:endParaRPr lang="en-US" altLang="ko-KR" sz="3200" dirty="0">
-              <a:solidFill>
-                <a:srgbClr val="000000"/>
-              </a:solidFill>
-              <a:highlight>
-                <a:srgbClr val="FFFFFF"/>
-              </a:highlight>
-              <a:latin typeface="Bitstream Vera Sans Mono" panose="020B0609030804020204" pitchFamily="49" charset="0"/>
-            </a:endParaRPr>
           </a:p>
         </p:txBody>
       </p:sp>
@@ -9339,27 +9318,19 @@
           <a:p>
             <a:r>
               <a:rPr lang="ko-KR" altLang="en-US" dirty="0" smtClean="0"/>
-              <a:t>좌표로</a:t>
-            </a:r>
-            <a:r>
-              <a:rPr lang="ko-KR" altLang="en-US" dirty="0"/>
-              <a:t> </a:t>
+              <a:t>좌표를 </a:t>
             </a:r>
             <a:r>
               <a:rPr lang="en-US" altLang="ko-KR" dirty="0" err="1" smtClean="0"/>
-              <a:t>int</a:t>
-            </a:r>
-            <a:r>
-              <a:rPr lang="ko-KR" altLang="en-US" dirty="0" smtClean="0"/>
-              <a:t>형 </a:t>
-            </a:r>
-            <a:r>
-              <a:rPr lang="en-US" altLang="ko-KR" dirty="0" smtClean="0"/>
-              <a:t>2</a:t>
-            </a:r>
-            <a:r>
-              <a:rPr lang="ko-KR" altLang="en-US" dirty="0" smtClean="0"/>
-              <a:t>개를 보낸다</a:t>
+              <a:t>Coord</a:t>
+            </a:r>
+            <a:r>
+              <a:rPr lang="ko-KR" altLang="en-US" dirty="0" smtClean="0"/>
+              <a:t>형으로 </a:t>
+            </a:r>
+            <a:r>
+              <a:rPr lang="ko-KR" altLang="en-US" dirty="0" smtClean="0"/>
+              <a:t>보낸다</a:t>
             </a:r>
             <a:r>
               <a:rPr lang="en-US" altLang="ko-KR" dirty="0" smtClean="0"/>
@@ -9380,7 +9351,7 @@
         <p:spPr bwMode="auto">
           <a:xfrm>
             <a:off x="2839339" y="3708906"/>
-            <a:ext cx="6513322" cy="584775"/>
+            <a:ext cx="6739345" cy="584775"/>
           </a:xfrm>
           <a:prstGeom prst="rect">
             <a:avLst/>
@@ -9451,7 +9422,31 @@
                 <a:latin typeface="Consolas" panose="020B0609020204030204" pitchFamily="49" charset="0"/>
                 <a:cs typeface="Consolas" panose="020B0609020204030204" pitchFamily="49" charset="0"/>
               </a:rPr>
-              <a:t>network.SubmitAttack(x, y); </a:t>
+              <a:t>network.SubmitAttack(</a:t>
+            </a:r>
+            <a:r>
+              <a:rPr lang="en-US" altLang="ko-KR" sz="3200" dirty="0" err="1" smtClean="0">
+                <a:solidFill>
+                  <a:srgbClr val="000000"/>
+                </a:solidFill>
+                <a:latin typeface="Consolas" panose="020B0609020204030204" pitchFamily="49" charset="0"/>
+                <a:cs typeface="Consolas" panose="020B0609020204030204" pitchFamily="49" charset="0"/>
+              </a:rPr>
+              <a:t>coord</a:t>
+            </a:r>
+            <a:r>
+              <a:rPr kumimoji="0" lang="ko-KR" altLang="ko-KR" sz="3200" b="0" i="0" u="none" strike="noStrike" cap="none" normalizeH="0" baseline="0" dirty="0" smtClean="0">
+                <a:ln>
+                  <a:noFill/>
+                </a:ln>
+                <a:solidFill>
+                  <a:srgbClr val="000000"/>
+                </a:solidFill>
+                <a:effectLst/>
+                <a:latin typeface="Consolas" panose="020B0609020204030204" pitchFamily="49" charset="0"/>
+                <a:cs typeface="Consolas" panose="020B0609020204030204" pitchFamily="49" charset="0"/>
+              </a:rPr>
+              <a:t>); </a:t>
             </a:r>
             <a:endParaRPr kumimoji="0" lang="ko-KR" altLang="ko-KR" sz="3200" b="0" i="0" u="none" strike="noStrike" cap="none" normalizeH="0" baseline="0" dirty="0" smtClean="0">
               <a:ln>
@@ -9564,7 +9559,7 @@
                 <a:latin typeface="Consolas" panose="020B0609020204030204" pitchFamily="49" charset="0"/>
                 <a:cs typeface="Consolas" panose="020B0609020204030204" pitchFamily="49" charset="0"/>
               </a:rPr>
-              <a:t>AttackResult</a:t>
+              <a:t>AttackResultData</a:t>
             </a:r>
             <a:r>
               <a:rPr lang="en-US" altLang="ko-KR" dirty="0" smtClean="0">
@@ -9638,7 +9633,7 @@
                 <a:latin typeface="Consolas" panose="020B0609020204030204" pitchFamily="49" charset="0"/>
                 <a:cs typeface="Consolas" panose="020B0609020204030204" pitchFamily="49" charset="0"/>
               </a:rPr>
-              <a:t>AttackResult</a:t>
+              <a:t>AttackResultTypes</a:t>
             </a:r>
             <a:r>
               <a:rPr lang="en-US" altLang="ko-KR" dirty="0" smtClean="0"/>
@@ -9670,8 +9665,8 @@
         </p:nvSpPr>
         <p:spPr bwMode="auto">
           <a:xfrm>
-            <a:off x="726510" y="4649881"/>
-            <a:ext cx="4673074" cy="584775"/>
+            <a:off x="634811" y="4637689"/>
+            <a:ext cx="5009705" cy="584775"/>
           </a:xfrm>
           <a:prstGeom prst="rect">
             <a:avLst/>
@@ -9776,6 +9771,21 @@
               <a:t>AttackResult</a:t>
             </a:r>
             <a:r>
+              <a:rPr kumimoji="0" lang="en-US" altLang="ko-KR" sz="1600" b="0" i="0" u="none" strike="noStrike" cap="none" normalizeH="0" baseline="0" dirty="0" smtClean="0">
+                <a:ln>
+                  <a:noFill/>
+                </a:ln>
+                <a:solidFill>
+                  <a:srgbClr val="2B91AF"/>
+                </a:solidFill>
+                <a:effectLst/>
+                <a:latin typeface="Consolas" panose="020B0609020204030204" pitchFamily="49" charset="0"/>
+                <a:ea typeface="Bitstream Vera Sans Mono" panose="020B0609030804020204" pitchFamily="49" charset="-127"/>
+                <a:cs typeface="Consolas" panose="020B0609020204030204" pitchFamily="49" charset="0"/>
+              </a:rPr>
+              <a:t>Data</a:t>
+            </a:r>
+            <a:r>
               <a:rPr kumimoji="0" lang="ko-KR" altLang="ko-KR" sz="1600" b="0" i="0" u="none" strike="noStrike" cap="none" normalizeH="0" baseline="0" dirty="0" smtClean="0">
                 <a:ln>
                   <a:noFill/>
@@ -9804,36 +9814,57 @@
             </a:endParaRPr>
           </a:p>
           <a:p>
-            <a:pPr marL="0" marR="0" lvl="0" indent="0" algn="l" defTabSz="914400" rtl="0" eaLnBrk="0" fontAlgn="base" latinLnBrk="0" hangingPunct="0">
-              <a:lnSpc>
-                <a:spcPct val="100000"/>
-              </a:lnSpc>
+            <a:pPr lvl="0" eaLnBrk="0" fontAlgn="base" latinLnBrk="0" hangingPunct="0">
               <a:spcBef>
                 <a:spcPct val="0"/>
               </a:spcBef>
               <a:spcAft>
                 <a:spcPct val="0"/>
               </a:spcAft>
-              <a:buClrTx/>
-              <a:buSzTx/>
-              <a:buFontTx/>
-              <a:buNone/>
-              <a:tabLst/>
             </a:pPr>
             <a:r>
-              <a:rPr kumimoji="0" lang="ko-KR" altLang="ko-KR" sz="1600" b="0" i="0" u="none" strike="noStrike" cap="none" normalizeH="0" baseline="0" dirty="0" smtClean="0">
-                <a:ln>
-                  <a:noFill/>
-                </a:ln>
-                <a:solidFill>
-                  <a:srgbClr val="000000"/>
-                </a:solidFill>
-                <a:effectLst/>
-                <a:latin typeface="Consolas" panose="020B0609020204030204" pitchFamily="49" charset="0"/>
-                <a:ea typeface="Bitstream Vera Sans Mono" panose="020B0609030804020204" pitchFamily="49" charset="-127"/>
-                <a:cs typeface="Consolas" panose="020B0609020204030204" pitchFamily="49" charset="0"/>
-              </a:rPr>
-              <a:t>network.GetAttackResult(&amp;attackResult); </a:t>
+              <a:rPr lang="ko-KR" altLang="ko-KR" sz="1600" dirty="0">
+                <a:solidFill>
+                  <a:srgbClr val="000000"/>
+                </a:solidFill>
+                <a:latin typeface="Consolas" panose="020B0609020204030204" pitchFamily="49" charset="0"/>
+                <a:ea typeface="Bitstream Vera Sans Mono" panose="020B0609030804020204" pitchFamily="49" charset="-127"/>
+                <a:cs typeface="Consolas" panose="020B0609020204030204" pitchFamily="49" charset="0"/>
+              </a:rPr>
+              <a:t>attackResult </a:t>
+            </a:r>
+            <a:r>
+              <a:rPr lang="en-US" altLang="ko-KR" sz="1600" dirty="0" smtClean="0">
+                <a:solidFill>
+                  <a:srgbClr val="000000"/>
+                </a:solidFill>
+                <a:latin typeface="Consolas" panose="020B0609020204030204" pitchFamily="49" charset="0"/>
+                <a:ea typeface="Bitstream Vera Sans Mono" panose="020B0609030804020204" pitchFamily="49" charset="-127"/>
+                <a:cs typeface="Consolas" panose="020B0609020204030204" pitchFamily="49" charset="0"/>
+              </a:rPr>
+              <a:t>= </a:t>
+            </a:r>
+            <a:r>
+              <a:rPr lang="ko-KR" altLang="ko-KR" sz="1600" dirty="0" smtClean="0">
+                <a:solidFill>
+                  <a:srgbClr val="000000"/>
+                </a:solidFill>
+                <a:latin typeface="Consolas" panose="020B0609020204030204" pitchFamily="49" charset="0"/>
+                <a:ea typeface="Bitstream Vera Sans Mono" panose="020B0609030804020204" pitchFamily="49" charset="-127"/>
+                <a:cs typeface="Consolas" panose="020B0609020204030204" pitchFamily="49" charset="0"/>
+              </a:rPr>
+              <a:t>network.GetAttackResult</a:t>
+            </a:r>
+            <a:r>
+              <a:rPr lang="ko-KR" altLang="ko-KR" sz="1600" dirty="0">
+                <a:solidFill>
+                  <a:srgbClr val="000000"/>
+                </a:solidFill>
+                <a:latin typeface="Consolas" panose="020B0609020204030204" pitchFamily="49" charset="0"/>
+                <a:ea typeface="Bitstream Vera Sans Mono" panose="020B0609030804020204" pitchFamily="49" charset="-127"/>
+                <a:cs typeface="Consolas" panose="020B0609020204030204" pitchFamily="49" charset="0"/>
+              </a:rPr>
+              <a:t>(); </a:t>
             </a:r>
             <a:endParaRPr kumimoji="0" lang="ko-KR" altLang="ko-KR" sz="1600" b="0" i="0" u="none" strike="noStrike" cap="none" normalizeH="0" baseline="0" dirty="0" smtClean="0">
               <a:ln>
@@ -9963,6 +9994,21 @@
                 <a:cs typeface="Consolas" panose="020B0609020204030204" pitchFamily="49" charset="0"/>
               </a:rPr>
               <a:t>AttackResult</a:t>
+            </a:r>
+            <a:r>
+              <a:rPr kumimoji="0" lang="en-US" altLang="ko-KR" sz="1600" b="0" i="0" u="none" strike="noStrike" cap="none" normalizeH="0" baseline="0" dirty="0" smtClean="0">
+                <a:ln>
+                  <a:noFill/>
+                </a:ln>
+                <a:solidFill>
+                  <a:srgbClr val="2B91AF"/>
+                </a:solidFill>
+                <a:effectLst/>
+                <a:latin typeface="Consolas" panose="020B0609020204030204" pitchFamily="49" charset="0"/>
+                <a:ea typeface="Bitstream Vera Sans Mono" panose="020B0609030804020204" pitchFamily="49" charset="-127"/>
+                <a:cs typeface="Consolas" panose="020B0609020204030204" pitchFamily="49" charset="0"/>
+              </a:rPr>
+              <a:t>Data</a:t>
             </a:r>
             <a:endParaRPr kumimoji="0" lang="en-US" altLang="ko-KR" sz="1600" b="0" i="0" u="none" strike="noStrike" cap="none" normalizeH="0" baseline="0" dirty="0" smtClean="0">
               <a:ln>
@@ -11209,7 +11255,7 @@
                 <a:latin typeface="Consolas" panose="020B0609020204030204" pitchFamily="49" charset="0"/>
                 <a:cs typeface="Consolas" panose="020B0609020204030204" pitchFamily="49" charset="0"/>
               </a:rPr>
-              <a:t>GameResult</a:t>
+              <a:t>GameResultData</a:t>
             </a:r>
             <a:r>
               <a:rPr lang="en-US" altLang="ko-KR" dirty="0" smtClean="0">
@@ -11282,8 +11328,8 @@
         </p:nvSpPr>
         <p:spPr bwMode="auto">
           <a:xfrm>
-            <a:off x="2048257" y="3395216"/>
-            <a:ext cx="8095486" cy="1077218"/>
+            <a:off x="1709222" y="3405377"/>
+            <a:ext cx="8773556" cy="1077218"/>
           </a:xfrm>
           <a:prstGeom prst="rect">
             <a:avLst/>
@@ -11388,6 +11434,21 @@
               <a:t>GameResult</a:t>
             </a:r>
             <a:r>
+              <a:rPr kumimoji="0" lang="en-US" altLang="ko-KR" sz="3200" b="0" i="0" u="none" strike="noStrike" cap="none" normalizeH="0" baseline="0" dirty="0" smtClean="0">
+                <a:ln>
+                  <a:noFill/>
+                </a:ln>
+                <a:solidFill>
+                  <a:srgbClr val="2B91AF"/>
+                </a:solidFill>
+                <a:effectLst/>
+                <a:latin typeface="Consolas" panose="020B0609020204030204" pitchFamily="49" charset="0"/>
+                <a:ea typeface="Bitstream Vera Sans Mono" panose="020B0609030804020204" pitchFamily="49" charset="-127"/>
+                <a:cs typeface="Consolas" panose="020B0609020204030204" pitchFamily="49" charset="0"/>
+              </a:rPr>
+              <a:t>Data</a:t>
+            </a:r>
+            <a:r>
               <a:rPr kumimoji="0" lang="ko-KR" altLang="ko-KR" sz="3200" b="0" i="0" u="none" strike="noStrike" cap="none" normalizeH="0" baseline="0" dirty="0" smtClean="0">
                 <a:ln>
                   <a:noFill/>
@@ -11416,36 +11477,57 @@
             </a:endParaRPr>
           </a:p>
           <a:p>
-            <a:pPr marL="0" marR="0" lvl="0" indent="0" algn="l" defTabSz="914400" rtl="0" eaLnBrk="0" fontAlgn="base" latinLnBrk="0" hangingPunct="0">
-              <a:lnSpc>
-                <a:spcPct val="100000"/>
-              </a:lnSpc>
+            <a:pPr lvl="0" eaLnBrk="0" fontAlgn="base" latinLnBrk="0" hangingPunct="0">
               <a:spcBef>
                 <a:spcPct val="0"/>
               </a:spcBef>
               <a:spcAft>
                 <a:spcPct val="0"/>
               </a:spcAft>
-              <a:buClrTx/>
-              <a:buSzTx/>
-              <a:buFontTx/>
-              <a:buNone/>
-              <a:tabLst/>
             </a:pPr>
             <a:r>
-              <a:rPr kumimoji="0" lang="ko-KR" altLang="ko-KR" sz="3200" b="0" i="0" u="none" strike="noStrike" cap="none" normalizeH="0" baseline="0" dirty="0" smtClean="0">
-                <a:ln>
-                  <a:noFill/>
-                </a:ln>
-                <a:solidFill>
-                  <a:srgbClr val="000000"/>
-                </a:solidFill>
-                <a:effectLst/>
-                <a:latin typeface="Consolas" panose="020B0609020204030204" pitchFamily="49" charset="0"/>
-                <a:ea typeface="Bitstream Vera Sans Mono" panose="020B0609030804020204" pitchFamily="49" charset="-127"/>
-                <a:cs typeface="Consolas" panose="020B0609020204030204" pitchFamily="49" charset="0"/>
-              </a:rPr>
-              <a:t>network.GetGameResult(&amp;gameResult);</a:t>
+              <a:rPr lang="ko-KR" altLang="ko-KR" sz="3200" dirty="0">
+                <a:solidFill>
+                  <a:srgbClr val="000000"/>
+                </a:solidFill>
+                <a:latin typeface="Consolas" panose="020B0609020204030204" pitchFamily="49" charset="0"/>
+                <a:ea typeface="Bitstream Vera Sans Mono" panose="020B0609030804020204" pitchFamily="49" charset="-127"/>
+                <a:cs typeface="Consolas" panose="020B0609020204030204" pitchFamily="49" charset="0"/>
+              </a:rPr>
+              <a:t>gameResult </a:t>
+            </a:r>
+            <a:r>
+              <a:rPr lang="en-US" altLang="ko-KR" sz="3200" dirty="0" smtClean="0">
+                <a:solidFill>
+                  <a:srgbClr val="000000"/>
+                </a:solidFill>
+                <a:latin typeface="Consolas" panose="020B0609020204030204" pitchFamily="49" charset="0"/>
+                <a:ea typeface="Bitstream Vera Sans Mono" panose="020B0609030804020204" pitchFamily="49" charset="-127"/>
+                <a:cs typeface="Consolas" panose="020B0609020204030204" pitchFamily="49" charset="0"/>
+              </a:rPr>
+              <a:t>= </a:t>
+            </a:r>
+            <a:r>
+              <a:rPr lang="ko-KR" altLang="ko-KR" sz="3200" dirty="0" smtClean="0">
+                <a:solidFill>
+                  <a:srgbClr val="000000"/>
+                </a:solidFill>
+                <a:latin typeface="Consolas" panose="020B0609020204030204" pitchFamily="49" charset="0"/>
+                <a:ea typeface="Bitstream Vera Sans Mono" panose="020B0609030804020204" pitchFamily="49" charset="-127"/>
+                <a:cs typeface="Consolas" panose="020B0609020204030204" pitchFamily="49" charset="0"/>
+              </a:rPr>
+              <a:t>network.GetGameResult</a:t>
+            </a:r>
+            <a:r>
+              <a:rPr lang="ko-KR" altLang="ko-KR" sz="3200" dirty="0">
+                <a:solidFill>
+                  <a:srgbClr val="000000"/>
+                </a:solidFill>
+                <a:latin typeface="Consolas" panose="020B0609020204030204" pitchFamily="49" charset="0"/>
+                <a:ea typeface="Bitstream Vera Sans Mono" panose="020B0609030804020204" pitchFamily="49" charset="-127"/>
+                <a:cs typeface="Consolas" panose="020B0609020204030204" pitchFamily="49" charset="0"/>
+              </a:rPr>
+              <a:t>();</a:t>
             </a:r>
             <a:endParaRPr kumimoji="0" lang="ko-KR" altLang="ko-KR" sz="3200" b="0" i="0" u="none" strike="noStrike" cap="none" normalizeH="0" baseline="0" dirty="0" smtClean="0">
               <a:ln>
@@ -11472,7 +11554,7 @@
         <p:spPr bwMode="auto">
           <a:xfrm>
             <a:off x="4937670" y="4539902"/>
-            <a:ext cx="2316660" cy="1323439"/>
+            <a:ext cx="2541080" cy="1323439"/>
           </a:xfrm>
           <a:prstGeom prst="rect">
             <a:avLst/>
@@ -11575,6 +11657,21 @@
                 <a:cs typeface="Consolas" panose="020B0609020204030204" pitchFamily="49" charset="0"/>
               </a:rPr>
               <a:t>GameResult</a:t>
+            </a:r>
+            <a:r>
+              <a:rPr kumimoji="0" lang="en-US" altLang="ko-KR" sz="1600" b="0" i="0" u="none" strike="noStrike" cap="none" normalizeH="0" baseline="0" dirty="0" smtClean="0">
+                <a:ln>
+                  <a:noFill/>
+                </a:ln>
+                <a:solidFill>
+                  <a:srgbClr val="2B91AF"/>
+                </a:solidFill>
+                <a:effectLst/>
+                <a:latin typeface="Consolas" panose="020B0609020204030204" pitchFamily="49" charset="0"/>
+                <a:ea typeface="Bitstream Vera Sans Mono" panose="020B0609030804020204" pitchFamily="49" charset="-127"/>
+                <a:cs typeface="Consolas" panose="020B0609020204030204" pitchFamily="49" charset="0"/>
+              </a:rPr>
+              <a:t>Data</a:t>
             </a:r>
             <a:endParaRPr kumimoji="0" lang="en-US" altLang="ko-KR" sz="1600" b="0" i="0" u="none" strike="noStrike" cap="none" normalizeH="0" baseline="0" dirty="0" smtClean="0">
               <a:ln>
@@ -13104,7 +13201,7 @@
                 <a:latin typeface="Consolas" panose="020B0609020204030204" pitchFamily="49" charset="0"/>
                 <a:cs typeface="Consolas" panose="020B0609020204030204" pitchFamily="49" charset="0"/>
               </a:rPr>
-              <a:t>FinalResult</a:t>
+              <a:t>FinalResultData</a:t>
             </a:r>
             <a:r>
               <a:rPr lang="en-US" altLang="ko-KR" dirty="0" smtClean="0"/>
@@ -13152,8 +13249,8 @@
         </p:nvSpPr>
         <p:spPr bwMode="auto">
           <a:xfrm>
-            <a:off x="1709222" y="3462685"/>
-            <a:ext cx="8773556" cy="1077218"/>
+            <a:off x="1483199" y="3484558"/>
+            <a:ext cx="9225602" cy="1077218"/>
           </a:xfrm>
           <a:prstGeom prst="rect">
             <a:avLst/>
@@ -13258,6 +13355,21 @@
               <a:t>FinalResult</a:t>
             </a:r>
             <a:r>
+              <a:rPr kumimoji="0" lang="en-US" altLang="ko-KR" sz="3200" b="0" i="0" u="none" strike="noStrike" cap="none" normalizeH="0" baseline="0" dirty="0" smtClean="0">
+                <a:ln>
+                  <a:noFill/>
+                </a:ln>
+                <a:solidFill>
+                  <a:srgbClr val="2B91AF"/>
+                </a:solidFill>
+                <a:effectLst/>
+                <a:latin typeface="Consolas" panose="020B0609020204030204" pitchFamily="49" charset="0"/>
+                <a:ea typeface="Bitstream Vera Sans Mono" panose="020B0609030804020204" pitchFamily="49" charset="-127"/>
+                <a:cs typeface="Consolas" panose="020B0609020204030204" pitchFamily="49" charset="0"/>
+              </a:rPr>
+              <a:t>Data</a:t>
+            </a:r>
+            <a:r>
               <a:rPr kumimoji="0" lang="ko-KR" altLang="ko-KR" sz="3200" b="0" i="0" u="none" strike="noStrike" cap="none" normalizeH="0" baseline="0" dirty="0" smtClean="0">
                 <a:ln>
                   <a:noFill/>
@@ -13286,36 +13398,57 @@
             </a:endParaRPr>
           </a:p>
           <a:p>
-            <a:pPr marL="0" marR="0" lvl="0" indent="0" algn="l" defTabSz="914400" rtl="0" eaLnBrk="0" fontAlgn="base" latinLnBrk="0" hangingPunct="0">
-              <a:lnSpc>
-                <a:spcPct val="100000"/>
-              </a:lnSpc>
+            <a:pPr lvl="0" eaLnBrk="0" fontAlgn="base" latinLnBrk="0" hangingPunct="0">
               <a:spcBef>
                 <a:spcPct val="0"/>
               </a:spcBef>
               <a:spcAft>
                 <a:spcPct val="0"/>
               </a:spcAft>
-              <a:buClrTx/>
-              <a:buSzTx/>
-              <a:buFontTx/>
-              <a:buNone/>
-              <a:tabLst/>
             </a:pPr>
             <a:r>
-              <a:rPr kumimoji="0" lang="ko-KR" altLang="ko-KR" sz="3200" b="0" i="0" u="none" strike="noStrike" cap="none" normalizeH="0" baseline="0" dirty="0" smtClean="0">
-                <a:ln>
-                  <a:noFill/>
-                </a:ln>
-                <a:solidFill>
-                  <a:srgbClr val="000000"/>
-                </a:solidFill>
-                <a:effectLst/>
-                <a:latin typeface="Consolas" panose="020B0609020204030204" pitchFamily="49" charset="0"/>
-                <a:ea typeface="Bitstream Vera Sans Mono" panose="020B0609030804020204" pitchFamily="49" charset="-127"/>
-                <a:cs typeface="Consolas" panose="020B0609020204030204" pitchFamily="49" charset="0"/>
-              </a:rPr>
-              <a:t>network.GetFinalResult(&amp;finalResult); </a:t>
+              <a:rPr lang="ko-KR" altLang="ko-KR" sz="3200" dirty="0" smtClean="0">
+                <a:solidFill>
+                  <a:srgbClr val="000000"/>
+                </a:solidFill>
+                <a:latin typeface="Consolas" panose="020B0609020204030204" pitchFamily="49" charset="0"/>
+                <a:ea typeface="Bitstream Vera Sans Mono" panose="020B0609030804020204" pitchFamily="49" charset="-127"/>
+                <a:cs typeface="Consolas" panose="020B0609020204030204" pitchFamily="49" charset="0"/>
+              </a:rPr>
+              <a:t>finalResult</a:t>
+            </a:r>
+            <a:r>
+              <a:rPr lang="en-US" altLang="ko-KR" sz="3200" dirty="0" smtClean="0">
+                <a:solidFill>
+                  <a:srgbClr val="000000"/>
+                </a:solidFill>
+                <a:latin typeface="Consolas" panose="020B0609020204030204" pitchFamily="49" charset="0"/>
+                <a:ea typeface="Bitstream Vera Sans Mono" panose="020B0609030804020204" pitchFamily="49" charset="-127"/>
+                <a:cs typeface="Consolas" panose="020B0609020204030204" pitchFamily="49" charset="0"/>
+              </a:rPr>
+              <a:t> = </a:t>
+            </a:r>
+            <a:r>
+              <a:rPr lang="ko-KR" altLang="ko-KR" sz="3200" dirty="0" smtClean="0">
+                <a:solidFill>
+                  <a:srgbClr val="000000"/>
+                </a:solidFill>
+                <a:latin typeface="Consolas" panose="020B0609020204030204" pitchFamily="49" charset="0"/>
+                <a:ea typeface="Bitstream Vera Sans Mono" panose="020B0609030804020204" pitchFamily="49" charset="-127"/>
+                <a:cs typeface="Consolas" panose="020B0609020204030204" pitchFamily="49" charset="0"/>
+              </a:rPr>
+              <a:t>network.GetFinalResult</a:t>
+            </a:r>
+            <a:r>
+              <a:rPr lang="ko-KR" altLang="ko-KR" sz="3200" dirty="0">
+                <a:solidFill>
+                  <a:srgbClr val="000000"/>
+                </a:solidFill>
+                <a:latin typeface="Consolas" panose="020B0609020204030204" pitchFamily="49" charset="0"/>
+                <a:ea typeface="Bitstream Vera Sans Mono" panose="020B0609030804020204" pitchFamily="49" charset="-127"/>
+                <a:cs typeface="Consolas" panose="020B0609020204030204" pitchFamily="49" charset="0"/>
+              </a:rPr>
+              <a:t>(); </a:t>
             </a:r>
             <a:endParaRPr kumimoji="0" lang="ko-KR" altLang="ko-KR" sz="3200" b="0" i="0" u="none" strike="noStrike" cap="none" normalizeH="0" baseline="0" dirty="0" smtClean="0">
               <a:ln>
@@ -16775,6 +16908,10 @@
             <a:endParaRPr lang="en-US" altLang="ko-KR" dirty="0"/>
           </a:p>
           <a:p>
+            <a:r>
+              <a:rPr lang="ko-KR" altLang="en-US" dirty="0" smtClean="0"/>
+              <a:t>내부적으로 사용될 때 </a:t>
+            </a:r>
             <a:r>
               <a:rPr lang="en-US" altLang="ko-KR" dirty="0" smtClean="0"/>
               <a:t>A1</a:t>

</xml_diff>